<commit_message>
Update slides for HumanTalks
</commit_message>
<xml_diff>
--- a/MutationTesting.pptx
+++ b/MutationTesting.pptx
@@ -5,18 +5,17 @@
     <p:sldMasterId id="2147483996" r:id="rId1"/>
   </p:sldMasterIdLst>
   <p:notesMasterIdLst>
-    <p:notesMasterId r:id="rId11"/>
+    <p:notesMasterId r:id="rId10"/>
   </p:notesMasterIdLst>
   <p:sldIdLst>
     <p:sldId id="256" r:id="rId2"/>
-    <p:sldId id="288" r:id="rId3"/>
-    <p:sldId id="258" r:id="rId4"/>
-    <p:sldId id="293" r:id="rId5"/>
-    <p:sldId id="294" r:id="rId6"/>
-    <p:sldId id="289" r:id="rId7"/>
-    <p:sldId id="291" r:id="rId8"/>
-    <p:sldId id="292" r:id="rId9"/>
-    <p:sldId id="287" r:id="rId10"/>
+    <p:sldId id="258" r:id="rId3"/>
+    <p:sldId id="293" r:id="rId4"/>
+    <p:sldId id="294" r:id="rId5"/>
+    <p:sldId id="289" r:id="rId6"/>
+    <p:sldId id="291" r:id="rId7"/>
+    <p:sldId id="292" r:id="rId8"/>
+    <p:sldId id="287" r:id="rId9"/>
   </p:sldIdLst>
   <p:sldSz cx="12192000" cy="6858000"/>
   <p:notesSz cx="6858000" cy="9144000"/>
@@ -205,7 +204,7 @@
           <a:p>
             <a:fld id="{6F890DD1-934A-46DB-A76A-050B491CBED9}" type="datetimeFigureOut">
               <a:rPr lang="fr-FR" smtClean="0"/>
-              <a:t>05/10/2016</a:t>
+              <a:t>07/10/2016</a:t>
             </a:fld>
             <a:endParaRPr lang="fr-FR"/>
           </a:p>
@@ -631,7 +630,7 @@
     </p:spTree>
     <p:extLst>
       <p:ext uri="{BB962C8B-B14F-4D97-AF65-F5344CB8AC3E}">
-        <p14:creationId xmlns:p14="http://schemas.microsoft.com/office/powerpoint/2010/main" val="2917094"/>
+        <p14:creationId xmlns:p14="http://schemas.microsoft.com/office/powerpoint/2010/main" val="3159332845"/>
       </p:ext>
     </p:extLst>
   </p:cSld>
@@ -715,7 +714,7 @@
     </p:spTree>
     <p:extLst>
       <p:ext uri="{BB962C8B-B14F-4D97-AF65-F5344CB8AC3E}">
-        <p14:creationId xmlns:p14="http://schemas.microsoft.com/office/powerpoint/2010/main" val="3159332845"/>
+        <p14:creationId xmlns:p14="http://schemas.microsoft.com/office/powerpoint/2010/main" val="2976779238"/>
       </p:ext>
     </p:extLst>
   </p:cSld>
@@ -799,7 +798,7 @@
     </p:spTree>
     <p:extLst>
       <p:ext uri="{BB962C8B-B14F-4D97-AF65-F5344CB8AC3E}">
-        <p14:creationId xmlns:p14="http://schemas.microsoft.com/office/powerpoint/2010/main" val="2976779238"/>
+        <p14:creationId xmlns:p14="http://schemas.microsoft.com/office/powerpoint/2010/main" val="840138670"/>
       </p:ext>
     </p:extLst>
   </p:cSld>
@@ -883,7 +882,7 @@
     </p:spTree>
     <p:extLst>
       <p:ext uri="{BB962C8B-B14F-4D97-AF65-F5344CB8AC3E}">
-        <p14:creationId xmlns:p14="http://schemas.microsoft.com/office/powerpoint/2010/main" val="840138670"/>
+        <p14:creationId xmlns:p14="http://schemas.microsoft.com/office/powerpoint/2010/main" val="2123124562"/>
       </p:ext>
     </p:extLst>
   </p:cSld>
@@ -967,7 +966,7 @@
     </p:spTree>
     <p:extLst>
       <p:ext uri="{BB962C8B-B14F-4D97-AF65-F5344CB8AC3E}">
-        <p14:creationId xmlns:p14="http://schemas.microsoft.com/office/powerpoint/2010/main" val="2123124562"/>
+        <p14:creationId xmlns:p14="http://schemas.microsoft.com/office/powerpoint/2010/main" val="152051622"/>
       </p:ext>
     </p:extLst>
   </p:cSld>
@@ -1051,7 +1050,7 @@
     </p:spTree>
     <p:extLst>
       <p:ext uri="{BB962C8B-B14F-4D97-AF65-F5344CB8AC3E}">
-        <p14:creationId xmlns:p14="http://schemas.microsoft.com/office/powerpoint/2010/main" val="152051622"/>
+        <p14:creationId xmlns:p14="http://schemas.microsoft.com/office/powerpoint/2010/main" val="1809363166"/>
       </p:ext>
     </p:extLst>
   </p:cSld>
@@ -1127,90 +1126,6 @@
             <a:fld id="{B3FA5667-073D-43B3-A132-51192281E66D}" type="slidenum">
               <a:rPr lang="fr-FR" smtClean="0"/>
               <a:t>8</a:t>
-            </a:fld>
-            <a:endParaRPr lang="fr-FR"/>
-          </a:p>
-        </p:txBody>
-      </p:sp>
-    </p:spTree>
-    <p:extLst>
-      <p:ext uri="{BB962C8B-B14F-4D97-AF65-F5344CB8AC3E}">
-        <p14:creationId xmlns:p14="http://schemas.microsoft.com/office/powerpoint/2010/main" val="1809363166"/>
-      </p:ext>
-    </p:extLst>
-  </p:cSld>
-  <p:clrMapOvr>
-    <a:masterClrMapping/>
-  </p:clrMapOvr>
-</p:notes>
-</file>
-
-<file path=ppt/notesSlides/notesSlide9.xml><?xml version="1.0" encoding="utf-8"?>
-<p:notes xmlns:a="http://schemas.openxmlformats.org/drawingml/2006/main" xmlns:r="http://schemas.openxmlformats.org/officeDocument/2006/relationships" xmlns:p="http://schemas.openxmlformats.org/presentationml/2006/main">
-  <p:cSld>
-    <p:spTree>
-      <p:nvGrpSpPr>
-        <p:cNvPr id="1" name=""/>
-        <p:cNvGrpSpPr/>
-        <p:nvPr/>
-      </p:nvGrpSpPr>
-      <p:grpSpPr>
-        <a:xfrm>
-          <a:off x="0" y="0"/>
-          <a:ext cx="0" cy="0"/>
-          <a:chOff x="0" y="0"/>
-          <a:chExt cx="0" cy="0"/>
-        </a:xfrm>
-      </p:grpSpPr>
-      <p:sp>
-        <p:nvSpPr>
-          <p:cNvPr id="2" name="Espace réservé de l'image des diapositives 1"/>
-          <p:cNvSpPr>
-            <a:spLocks noGrp="1" noRot="1" noChangeAspect="1"/>
-          </p:cNvSpPr>
-          <p:nvPr>
-            <p:ph type="sldImg"/>
-          </p:nvPr>
-        </p:nvSpPr>
-        <p:spPr/>
-      </p:sp>
-      <p:sp>
-        <p:nvSpPr>
-          <p:cNvPr id="3" name="Espace réservé des commentaires 2"/>
-          <p:cNvSpPr>
-            <a:spLocks noGrp="1"/>
-          </p:cNvSpPr>
-          <p:nvPr>
-            <p:ph type="body" idx="1"/>
-          </p:nvPr>
-        </p:nvSpPr>
-        <p:spPr/>
-        <p:txBody>
-          <a:bodyPr/>
-          <a:lstStyle/>
-          <a:p>
-            <a:endParaRPr lang="fr-FR" dirty="0"/>
-          </a:p>
-        </p:txBody>
-      </p:sp>
-      <p:sp>
-        <p:nvSpPr>
-          <p:cNvPr id="4" name="Espace réservé du numéro de diapositive 3"/>
-          <p:cNvSpPr>
-            <a:spLocks noGrp="1"/>
-          </p:cNvSpPr>
-          <p:nvPr>
-            <p:ph type="sldNum" sz="quarter" idx="10"/>
-          </p:nvPr>
-        </p:nvSpPr>
-        <p:spPr/>
-        <p:txBody>
-          <a:bodyPr/>
-          <a:lstStyle/>
-          <a:p>
-            <a:fld id="{B3FA5667-073D-43B3-A132-51192281E66D}" type="slidenum">
-              <a:rPr lang="fr-FR" smtClean="0"/>
-              <a:t>9</a:t>
             </a:fld>
             <a:endParaRPr lang="fr-FR"/>
           </a:p>
@@ -1360,7 +1275,7 @@
           <a:p>
             <a:fld id="{DB98E886-997B-4F4B-A71B-ADB910CEE090}" type="datetimeFigureOut">
               <a:rPr lang="fr-FR" smtClean="0"/>
-              <a:t>05/10/2016</a:t>
+              <a:t>07/10/2016</a:t>
             </a:fld>
             <a:endParaRPr lang="fr-FR"/>
           </a:p>
@@ -1530,7 +1445,7 @@
           <a:p>
             <a:fld id="{DB98E886-997B-4F4B-A71B-ADB910CEE090}" type="datetimeFigureOut">
               <a:rPr lang="fr-FR" smtClean="0"/>
-              <a:t>05/10/2016</a:t>
+              <a:t>07/10/2016</a:t>
             </a:fld>
             <a:endParaRPr lang="fr-FR"/>
           </a:p>
@@ -1710,7 +1625,7 @@
           <a:p>
             <a:fld id="{DB98E886-997B-4F4B-A71B-ADB910CEE090}" type="datetimeFigureOut">
               <a:rPr lang="fr-FR" smtClean="0"/>
-              <a:t>05/10/2016</a:t>
+              <a:t>07/10/2016</a:t>
             </a:fld>
             <a:endParaRPr lang="fr-FR"/>
           </a:p>
@@ -1880,7 +1795,7 @@
           <a:p>
             <a:fld id="{DB98E886-997B-4F4B-A71B-ADB910CEE090}" type="datetimeFigureOut">
               <a:rPr lang="fr-FR" smtClean="0"/>
-              <a:t>05/10/2016</a:t>
+              <a:t>07/10/2016</a:t>
             </a:fld>
             <a:endParaRPr lang="fr-FR"/>
           </a:p>
@@ -2126,7 +2041,7 @@
           <a:p>
             <a:fld id="{DB98E886-997B-4F4B-A71B-ADB910CEE090}" type="datetimeFigureOut">
               <a:rPr lang="fr-FR" smtClean="0"/>
-              <a:t>05/10/2016</a:t>
+              <a:t>07/10/2016</a:t>
             </a:fld>
             <a:endParaRPr lang="fr-FR"/>
           </a:p>
@@ -2358,7 +2273,7 @@
           <a:p>
             <a:fld id="{DB98E886-997B-4F4B-A71B-ADB910CEE090}" type="datetimeFigureOut">
               <a:rPr lang="fr-FR" smtClean="0"/>
-              <a:t>05/10/2016</a:t>
+              <a:t>07/10/2016</a:t>
             </a:fld>
             <a:endParaRPr lang="fr-FR"/>
           </a:p>
@@ -2725,7 +2640,7 @@
           <a:p>
             <a:fld id="{DB98E886-997B-4F4B-A71B-ADB910CEE090}" type="datetimeFigureOut">
               <a:rPr lang="fr-FR" smtClean="0"/>
-              <a:t>05/10/2016</a:t>
+              <a:t>07/10/2016</a:t>
             </a:fld>
             <a:endParaRPr lang="fr-FR"/>
           </a:p>
@@ -2843,7 +2758,7 @@
           <a:p>
             <a:fld id="{DB98E886-997B-4F4B-A71B-ADB910CEE090}" type="datetimeFigureOut">
               <a:rPr lang="fr-FR" smtClean="0"/>
-              <a:t>05/10/2016</a:t>
+              <a:t>07/10/2016</a:t>
             </a:fld>
             <a:endParaRPr lang="fr-FR"/>
           </a:p>
@@ -2938,7 +2853,7 @@
           <a:p>
             <a:fld id="{DB98E886-997B-4F4B-A71B-ADB910CEE090}" type="datetimeFigureOut">
               <a:rPr lang="fr-FR" smtClean="0"/>
-              <a:t>05/10/2016</a:t>
+              <a:t>07/10/2016</a:t>
             </a:fld>
             <a:endParaRPr lang="fr-FR"/>
           </a:p>
@@ -3215,7 +3130,7 @@
           <a:p>
             <a:fld id="{DB98E886-997B-4F4B-A71B-ADB910CEE090}" type="datetimeFigureOut">
               <a:rPr lang="fr-FR" smtClean="0"/>
-              <a:t>05/10/2016</a:t>
+              <a:t>07/10/2016</a:t>
             </a:fld>
             <a:endParaRPr lang="fr-FR"/>
           </a:p>
@@ -3468,7 +3383,7 @@
           <a:p>
             <a:fld id="{DB98E886-997B-4F4B-A71B-ADB910CEE090}" type="datetimeFigureOut">
               <a:rPr lang="fr-FR" smtClean="0"/>
-              <a:t>05/10/2016</a:t>
+              <a:t>07/10/2016</a:t>
             </a:fld>
             <a:endParaRPr lang="fr-FR"/>
           </a:p>
@@ -3690,7 +3605,7 @@
           <a:p>
             <a:fld id="{DB98E886-997B-4F4B-A71B-ADB910CEE090}" type="datetimeFigureOut">
               <a:rPr lang="fr-FR" smtClean="0"/>
-              <a:t>05/10/2016</a:t>
+              <a:t>07/10/2016</a:t>
             </a:fld>
             <a:endParaRPr lang="fr-FR"/>
           </a:p>
@@ -4205,7 +4120,6 @@
               <a:rPr lang="fr-FR" dirty="0"/>
               <a:t>https://github.com/RomainTrm/DemoMutationTesting</a:t>
             </a:r>
-            <a:endParaRPr lang="fr-FR" dirty="0"/>
           </a:p>
         </p:txBody>
       </p:sp>
@@ -4240,20 +4154,6 @@
 <file path=ppt/slides/slide2.xml><?xml version="1.0" encoding="utf-8"?>
 <p:sld xmlns:a="http://schemas.openxmlformats.org/drawingml/2006/main" xmlns:r="http://schemas.openxmlformats.org/officeDocument/2006/relationships" xmlns:p="http://schemas.openxmlformats.org/presentationml/2006/main">
   <p:cSld>
-    <p:bg>
-      <p:bgPr>
-        <a:blipFill dpi="0" rotWithShape="1">
-          <a:blip r:embed="rId3">
-            <a:lum/>
-          </a:blip>
-          <a:srcRect/>
-          <a:stretch>
-            <a:fillRect b="48500"/>
-          </a:stretch>
-        </a:blipFill>
-        <a:effectLst/>
-      </p:bgPr>
-    </p:bg>
     <p:spTree>
       <p:nvGrpSpPr>
         <p:cNvPr id="1" name=""/>
@@ -4275,28 +4175,23 @@
             <a:spLocks noGrp="1"/>
           </p:cNvSpPr>
           <p:nvPr>
-            <p:ph type="ctrTitle"/>
-          </p:nvPr>
-        </p:nvSpPr>
-        <p:spPr>
-          <a:xfrm>
-            <a:off x="1524000" y="1086738"/>
-            <a:ext cx="9144000" cy="2387600"/>
-          </a:xfrm>
-        </p:spPr>
-        <p:txBody>
-          <a:bodyPr/>
-          <a:lstStyle/>
-          <a:p>
-            <a:r>
-              <a:rPr lang="fr-FR" i="1" dirty="0" smtClean="0">
+            <p:ph type="title"/>
+          </p:nvPr>
+        </p:nvSpPr>
+        <p:spPr/>
+        <p:txBody>
+          <a:bodyPr/>
+          <a:lstStyle/>
+          <a:p>
+            <a:r>
+              <a:rPr lang="fr-FR" dirty="0" smtClean="0">
                 <a:solidFill>
                   <a:schemeClr val="bg1"/>
                 </a:solidFill>
               </a:rPr>
-              <a:t>Le principe</a:t>
-            </a:r>
-            <a:endParaRPr lang="fr-FR" b="1" dirty="0">
+              <a:t>Les tests unitaires</a:t>
+            </a:r>
+            <a:endParaRPr lang="fr-FR" dirty="0">
               <a:solidFill>
                 <a:schemeClr val="bg1"/>
               </a:solidFill>
@@ -4306,32 +4201,77 @@
       </p:sp>
       <p:sp>
         <p:nvSpPr>
-          <p:cNvPr id="3" name="Sous-titre 2"/>
-          <p:cNvSpPr>
-            <a:spLocks noGrp="1"/>
-          </p:cNvSpPr>
-          <p:nvPr>
-            <p:ph type="subTitle" idx="1"/>
-          </p:nvPr>
-        </p:nvSpPr>
-        <p:spPr>
-          <a:xfrm>
-            <a:off x="1524000" y="3637663"/>
-            <a:ext cx="9144000" cy="1655762"/>
-          </a:xfrm>
-        </p:spPr>
-        <p:txBody>
-          <a:bodyPr/>
-          <a:lstStyle/>
-          <a:p>
-            <a:endParaRPr lang="fr-FR" i="1" dirty="0"/>
+          <p:cNvPr id="6" name="Espace réservé du contenu 5"/>
+          <p:cNvSpPr>
+            <a:spLocks noGrp="1"/>
+          </p:cNvSpPr>
+          <p:nvPr>
+            <p:ph idx="1"/>
+          </p:nvPr>
+        </p:nvSpPr>
+        <p:spPr/>
+        <p:txBody>
+          <a:bodyPr/>
+          <a:lstStyle/>
+          <a:p>
+            <a:r>
+              <a:rPr lang="fr-FR" dirty="0" smtClean="0"/>
+              <a:t>Indépen</a:t>
+            </a:r>
+            <a:r>
+              <a:rPr lang="fr-FR" dirty="0" smtClean="0"/>
+              <a:t>dants des autres tests, du système, etc.</a:t>
+            </a:r>
+          </a:p>
+          <a:p>
+            <a:r>
+              <a:rPr lang="fr-FR" dirty="0" smtClean="0"/>
+              <a:t>Testent une chose à la fois</a:t>
+            </a:r>
+            <a:endParaRPr lang="fr-FR" dirty="0"/>
+          </a:p>
+          <a:p>
+            <a:r>
+              <a:rPr lang="fr-FR" dirty="0"/>
+              <a:t>Protègent des </a:t>
+            </a:r>
+            <a:r>
+              <a:rPr lang="fr-FR" dirty="0" smtClean="0"/>
+              <a:t>régressions</a:t>
+            </a:r>
+            <a:endParaRPr lang="fr-FR" dirty="0" smtClean="0"/>
+          </a:p>
+          <a:p>
+            <a:r>
+              <a:rPr lang="fr-FR" dirty="0" smtClean="0"/>
+              <a:t>Documentent le code</a:t>
+            </a:r>
+          </a:p>
+          <a:p>
+            <a:endParaRPr lang="fr-FR" dirty="0" smtClean="0"/>
+          </a:p>
+          <a:p>
+            <a:pPr marL="0" indent="0" algn="ctr">
+              <a:buNone/>
+            </a:pPr>
+            <a:r>
+              <a:rPr lang="fr-FR" u="sng" dirty="0" smtClean="0"/>
+              <a:t>Un </a:t>
+            </a:r>
+            <a:r>
+              <a:rPr lang="fr-FR" u="sng" dirty="0" smtClean="0"/>
+              <a:t>comportement = un test</a:t>
+            </a:r>
+          </a:p>
+          <a:p>
+            <a:endParaRPr lang="fr-FR" dirty="0"/>
           </a:p>
         </p:txBody>
       </p:sp>
     </p:spTree>
     <p:extLst>
       <p:ext uri="{BB962C8B-B14F-4D97-AF65-F5344CB8AC3E}">
-        <p14:creationId xmlns:p14="http://schemas.microsoft.com/office/powerpoint/2010/main" val="2258722868"/>
+        <p14:creationId xmlns:p14="http://schemas.microsoft.com/office/powerpoint/2010/main" val="2760156610"/>
       </p:ext>
     </p:extLst>
   </p:cSld>
@@ -4398,7 +4338,7 @@
                   <a:schemeClr val="bg1"/>
                 </a:solidFill>
               </a:rPr>
-              <a:t>Les tests unitaires</a:t>
+              <a:t>Avez-vous confiance ?</a:t>
             </a:r>
             <a:endParaRPr lang="fr-FR" dirty="0">
               <a:solidFill>
@@ -4425,24 +4365,73 @@
           <a:p>
             <a:r>
               <a:rPr lang="fr-FR" dirty="0" smtClean="0"/>
-              <a:t>Valident des comportements</a:t>
-            </a:r>
+              <a:t>Bonne couverture ?</a:t>
+            </a:r>
+          </a:p>
+          <a:p>
+            <a:r>
+              <a:rPr lang="fr-FR" dirty="0" smtClean="0"/>
+              <a:t>Existence de cas non couverts ?</a:t>
+            </a:r>
+          </a:p>
+          <a:p>
+            <a:pPr marL="0" indent="0">
+              <a:buNone/>
+            </a:pPr>
+            <a:endParaRPr lang="fr-FR" dirty="0"/>
+          </a:p>
+          <a:p>
+            <a:pPr marL="0" indent="0" algn="ctr">
+              <a:buNone/>
+            </a:pPr>
+            <a:r>
+              <a:rPr lang="fr-FR" u="sng" dirty="0" smtClean="0"/>
+              <a:t>Bugs potentiels</a:t>
+            </a:r>
+          </a:p>
+          <a:p>
             <a:endParaRPr lang="fr-FR" dirty="0" smtClean="0"/>
           </a:p>
           <a:p>
             <a:r>
               <a:rPr lang="fr-FR" dirty="0" smtClean="0"/>
-              <a:t>Protègent des régressions</a:t>
-            </a:r>
-          </a:p>
-          <a:p>
+              <a:t>Deux approches :</a:t>
+            </a:r>
+          </a:p>
+          <a:p>
+            <a:pPr lvl="1"/>
+            <a:r>
+              <a:rPr lang="fr-FR" dirty="0" err="1" smtClean="0"/>
+              <a:t>Property</a:t>
+            </a:r>
             <a:r>
               <a:rPr lang="fr-FR" dirty="0" smtClean="0"/>
-              <a:t>Un comportement = un test</a:t>
+              <a:t> </a:t>
+            </a:r>
+            <a:r>
+              <a:rPr lang="fr-FR" dirty="0" err="1" smtClean="0"/>
+              <a:t>Based</a:t>
+            </a:r>
+            <a:r>
+              <a:rPr lang="fr-FR" dirty="0" smtClean="0"/>
+              <a:t> </a:t>
+            </a:r>
+            <a:r>
+              <a:rPr lang="fr-FR" dirty="0" err="1" smtClean="0"/>
+              <a:t>Testing</a:t>
             </a:r>
             <a:endParaRPr lang="fr-FR" dirty="0" smtClean="0"/>
           </a:p>
           <a:p>
+            <a:pPr lvl="1"/>
+            <a:r>
+              <a:rPr lang="fr-FR" dirty="0" smtClean="0"/>
+              <a:t>Mutation </a:t>
+            </a:r>
+            <a:r>
+              <a:rPr lang="fr-FR" dirty="0" err="1" smtClean="0"/>
+              <a:t>Testing</a:t>
+            </a:r>
             <a:endParaRPr lang="fr-FR" dirty="0"/>
           </a:p>
         </p:txBody>
@@ -4450,7 +4439,7 @@
     </p:spTree>
     <p:extLst>
       <p:ext uri="{BB962C8B-B14F-4D97-AF65-F5344CB8AC3E}">
-        <p14:creationId xmlns:p14="http://schemas.microsoft.com/office/powerpoint/2010/main" val="2760156610"/>
+        <p14:creationId xmlns:p14="http://schemas.microsoft.com/office/powerpoint/2010/main" val="3053819119"/>
       </p:ext>
     </p:extLst>
   </p:cSld>
@@ -4517,7 +4506,7 @@
                   <a:schemeClr val="bg1"/>
                 </a:solidFill>
               </a:rPr>
-              <a:t>Avez-vous confiance ?</a:t>
+              <a:t>Les mutations</a:t>
             </a:r>
             <a:endParaRPr lang="fr-FR" dirty="0">
               <a:solidFill>
@@ -4544,74 +4533,43 @@
           <a:p>
             <a:r>
               <a:rPr lang="fr-FR" dirty="0" smtClean="0"/>
-              <a:t>Bonne couverture ?</a:t>
-            </a:r>
-          </a:p>
-          <a:p>
+              <a:t>Mutation du code, exemples :</a:t>
+            </a:r>
+          </a:p>
+          <a:p>
+            <a:pPr lvl="1"/>
             <a:r>
               <a:rPr lang="fr-FR" dirty="0" smtClean="0"/>
-              <a:t>Existence de cas non couverts ?</a:t>
-            </a:r>
-          </a:p>
-          <a:p>
-            <a:pPr marL="0" indent="0">
-              <a:buNone/>
-            </a:pPr>
-            <a:endParaRPr lang="fr-FR" dirty="0"/>
-          </a:p>
-          <a:p>
-            <a:pPr marL="0" indent="0" algn="ctr">
-              <a:buNone/>
-            </a:pPr>
-            <a:r>
-              <a:rPr lang="fr-FR" u="sng" dirty="0" smtClean="0"/>
-              <a:t>Bugs potentiels</a:t>
-            </a:r>
-            <a:endParaRPr lang="fr-FR" u="sng" dirty="0" smtClean="0"/>
-          </a:p>
-          <a:p>
-            <a:endParaRPr lang="fr-FR" dirty="0" smtClean="0"/>
-          </a:p>
-          <a:p>
+              <a:t>&lt; devient &lt;=</a:t>
+            </a:r>
+          </a:p>
+          <a:p>
+            <a:pPr lvl="1"/>
             <a:r>
               <a:rPr lang="fr-FR" dirty="0" smtClean="0"/>
-              <a:t>Deux approches :</a:t>
+              <a:t>== devient !=</a:t>
             </a:r>
           </a:p>
           <a:p>
             <a:pPr lvl="1"/>
             <a:r>
-              <a:rPr lang="fr-FR" dirty="0" err="1" smtClean="0"/>
-              <a:t>Property</a:t>
-            </a:r>
-            <a:r>
               <a:rPr lang="fr-FR" dirty="0" smtClean="0"/>
-              <a:t> </a:t>
-            </a:r>
-            <a:r>
-              <a:rPr lang="fr-FR" dirty="0" err="1" smtClean="0"/>
-              <a:t>Based</a:t>
-            </a:r>
+              <a:t>…</a:t>
+            </a:r>
+          </a:p>
+          <a:p>
             <a:r>
               <a:rPr lang="fr-FR" dirty="0" smtClean="0"/>
-              <a:t> </a:t>
-            </a:r>
-            <a:r>
-              <a:rPr lang="fr-FR" dirty="0" err="1" smtClean="0"/>
-              <a:t>Testing</a:t>
-            </a:r>
-            <a:endParaRPr lang="fr-FR" dirty="0" smtClean="0"/>
-          </a:p>
-          <a:p>
-            <a:pPr lvl="1"/>
+              <a:t>Un mutant mort = un test unitaire échoue</a:t>
+            </a:r>
+          </a:p>
+          <a:p>
             <a:r>
               <a:rPr lang="fr-FR" dirty="0" smtClean="0"/>
-              <a:t>Mutation </a:t>
-            </a:r>
-            <a:r>
-              <a:rPr lang="fr-FR" dirty="0" err="1" smtClean="0"/>
-              <a:t>Testing</a:t>
-            </a:r>
+              <a:t>Un mutant vivant = aucun test n’a échoué</a:t>
+            </a:r>
+          </a:p>
+          <a:p>
             <a:endParaRPr lang="fr-FR" dirty="0"/>
           </a:p>
         </p:txBody>
@@ -4619,20 +4577,20 @@
     </p:spTree>
     <p:extLst>
       <p:ext uri="{BB962C8B-B14F-4D97-AF65-F5344CB8AC3E}">
-        <p14:creationId xmlns:p14="http://schemas.microsoft.com/office/powerpoint/2010/main" val="3053819119"/>
+        <p14:creationId xmlns:p14="http://schemas.microsoft.com/office/powerpoint/2010/main" val="809745681"/>
       </p:ext>
     </p:extLst>
   </p:cSld>
   <p:clrMapOvr>
     <a:masterClrMapping/>
   </p:clrMapOvr>
-  <mc:AlternateContent xmlns:mc="http://schemas.openxmlformats.org/markup-compatibility/2006">
-    <mc:Choice xmlns:p14="http://schemas.microsoft.com/office/powerpoint/2010/main" Requires="p14">
+  <mc:AlternateContent xmlns:mc="http://schemas.openxmlformats.org/markup-compatibility/2006" xmlns:p14="http://schemas.microsoft.com/office/powerpoint/2010/main">
+    <mc:Choice Requires="p14">
       <p:transition spd="med" p14:dur="700">
         <p:fade/>
       </p:transition>
     </mc:Choice>
-    <mc:Fallback>
+    <mc:Fallback xmlns="">
       <p:transition spd="med">
         <p:fade/>
       </p:transition>
@@ -4649,145 +4607,6 @@
 </file>
 
 <file path=ppt/slides/slide5.xml><?xml version="1.0" encoding="utf-8"?>
-<p:sld xmlns:a="http://schemas.openxmlformats.org/drawingml/2006/main" xmlns:r="http://schemas.openxmlformats.org/officeDocument/2006/relationships" xmlns:p="http://schemas.openxmlformats.org/presentationml/2006/main">
-  <p:cSld>
-    <p:spTree>
-      <p:nvGrpSpPr>
-        <p:cNvPr id="1" name=""/>
-        <p:cNvGrpSpPr/>
-        <p:nvPr/>
-      </p:nvGrpSpPr>
-      <p:grpSpPr>
-        <a:xfrm>
-          <a:off x="0" y="0"/>
-          <a:ext cx="0" cy="0"/>
-          <a:chOff x="0" y="0"/>
-          <a:chExt cx="0" cy="0"/>
-        </a:xfrm>
-      </p:grpSpPr>
-      <p:sp>
-        <p:nvSpPr>
-          <p:cNvPr id="2" name="Titre 1"/>
-          <p:cNvSpPr>
-            <a:spLocks noGrp="1"/>
-          </p:cNvSpPr>
-          <p:nvPr>
-            <p:ph type="title"/>
-          </p:nvPr>
-        </p:nvSpPr>
-        <p:spPr/>
-        <p:txBody>
-          <a:bodyPr/>
-          <a:lstStyle/>
-          <a:p>
-            <a:r>
-              <a:rPr lang="fr-FR" dirty="0" smtClean="0">
-                <a:solidFill>
-                  <a:schemeClr val="bg1"/>
-                </a:solidFill>
-              </a:rPr>
-              <a:t>Les mutations</a:t>
-            </a:r>
-            <a:endParaRPr lang="fr-FR" dirty="0">
-              <a:solidFill>
-                <a:schemeClr val="bg1"/>
-              </a:solidFill>
-            </a:endParaRPr>
-          </a:p>
-        </p:txBody>
-      </p:sp>
-      <p:sp>
-        <p:nvSpPr>
-          <p:cNvPr id="6" name="Espace réservé du contenu 5"/>
-          <p:cNvSpPr>
-            <a:spLocks noGrp="1"/>
-          </p:cNvSpPr>
-          <p:nvPr>
-            <p:ph idx="1"/>
-          </p:nvPr>
-        </p:nvSpPr>
-        <p:spPr/>
-        <p:txBody>
-          <a:bodyPr/>
-          <a:lstStyle/>
-          <a:p>
-            <a:r>
-              <a:rPr lang="fr-FR" dirty="0" smtClean="0"/>
-              <a:t>Mutation du code, exemples :</a:t>
-            </a:r>
-          </a:p>
-          <a:p>
-            <a:pPr lvl="1"/>
-            <a:r>
-              <a:rPr lang="fr-FR" dirty="0" smtClean="0"/>
-              <a:t>&lt; devient &lt;=</a:t>
-            </a:r>
-          </a:p>
-          <a:p>
-            <a:pPr lvl="1"/>
-            <a:r>
-              <a:rPr lang="fr-FR" dirty="0" smtClean="0"/>
-              <a:t>== devient !=</a:t>
-            </a:r>
-          </a:p>
-          <a:p>
-            <a:pPr lvl="1"/>
-            <a:r>
-              <a:rPr lang="fr-FR" dirty="0" smtClean="0"/>
-              <a:t>…</a:t>
-            </a:r>
-          </a:p>
-          <a:p>
-            <a:r>
-              <a:rPr lang="fr-FR" dirty="0" smtClean="0"/>
-              <a:t>Un mutant mort = un test unitaire échoue</a:t>
-            </a:r>
-          </a:p>
-          <a:p>
-            <a:r>
-              <a:rPr lang="fr-FR" dirty="0" smtClean="0"/>
-              <a:t>Un mutant vivant = aucun test n’a échoué</a:t>
-            </a:r>
-            <a:endParaRPr lang="fr-FR" dirty="0" smtClean="0"/>
-          </a:p>
-          <a:p>
-            <a:endParaRPr lang="fr-FR" dirty="0"/>
-          </a:p>
-        </p:txBody>
-      </p:sp>
-    </p:spTree>
-    <p:extLst>
-      <p:ext uri="{BB962C8B-B14F-4D97-AF65-F5344CB8AC3E}">
-        <p14:creationId xmlns:p14="http://schemas.microsoft.com/office/powerpoint/2010/main" val="809745681"/>
-      </p:ext>
-    </p:extLst>
-  </p:cSld>
-  <p:clrMapOvr>
-    <a:masterClrMapping/>
-  </p:clrMapOvr>
-  <mc:AlternateContent xmlns:mc="http://schemas.openxmlformats.org/markup-compatibility/2006">
-    <mc:Choice xmlns:p14="http://schemas.microsoft.com/office/powerpoint/2010/main" Requires="p14">
-      <p:transition spd="med" p14:dur="700">
-        <p:fade/>
-      </p:transition>
-    </mc:Choice>
-    <mc:Fallback>
-      <p:transition spd="med">
-        <p:fade/>
-      </p:transition>
-    </mc:Fallback>
-  </mc:AlternateContent>
-  <p:timing>
-    <p:tnLst>
-      <p:par>
-        <p:cTn id="1" dur="indefinite" restart="never" nodeType="tmRoot"/>
-      </p:par>
-    </p:tnLst>
-  </p:timing>
-</p:sld>
-</file>
-
-<file path=ppt/slides/slide6.xml><?xml version="1.0" encoding="utf-8"?>
 <p:sld xmlns:a="http://schemas.openxmlformats.org/drawingml/2006/main" xmlns:r="http://schemas.openxmlformats.org/officeDocument/2006/relationships" xmlns:p="http://schemas.openxmlformats.org/presentationml/2006/main">
   <p:cSld>
     <p:bg>
@@ -4888,13 +4707,145 @@
   <p:clrMapOvr>
     <a:masterClrMapping/>
   </p:clrMapOvr>
-  <mc:AlternateContent xmlns:mc="http://schemas.openxmlformats.org/markup-compatibility/2006">
-    <mc:Choice xmlns:p14="http://schemas.microsoft.com/office/powerpoint/2010/main" Requires="p14">
+  <mc:AlternateContent xmlns:mc="http://schemas.openxmlformats.org/markup-compatibility/2006" xmlns:p14="http://schemas.microsoft.com/office/powerpoint/2010/main">
+    <mc:Choice Requires="p14">
       <p:transition spd="med" p14:dur="700">
         <p:fade/>
       </p:transition>
     </mc:Choice>
-    <mc:Fallback>
+    <mc:Fallback xmlns="">
+      <p:transition spd="med">
+        <p:fade/>
+      </p:transition>
+    </mc:Fallback>
+  </mc:AlternateContent>
+  <p:timing>
+    <p:tnLst>
+      <p:par>
+        <p:cTn id="1" dur="indefinite" restart="never" nodeType="tmRoot"/>
+      </p:par>
+    </p:tnLst>
+  </p:timing>
+</p:sld>
+</file>
+
+<file path=ppt/slides/slide6.xml><?xml version="1.0" encoding="utf-8"?>
+<p:sld xmlns:a="http://schemas.openxmlformats.org/drawingml/2006/main" xmlns:r="http://schemas.openxmlformats.org/officeDocument/2006/relationships" xmlns:p="http://schemas.openxmlformats.org/presentationml/2006/main">
+  <p:cSld>
+    <p:spTree>
+      <p:nvGrpSpPr>
+        <p:cNvPr id="1" name=""/>
+        <p:cNvGrpSpPr/>
+        <p:nvPr/>
+      </p:nvGrpSpPr>
+      <p:grpSpPr>
+        <a:xfrm>
+          <a:off x="0" y="0"/>
+          <a:ext cx="0" cy="0"/>
+          <a:chOff x="0" y="0"/>
+          <a:chExt cx="0" cy="0"/>
+        </a:xfrm>
+      </p:grpSpPr>
+      <p:sp>
+        <p:nvSpPr>
+          <p:cNvPr id="2" name="Titre 1"/>
+          <p:cNvSpPr>
+            <a:spLocks noGrp="1"/>
+          </p:cNvSpPr>
+          <p:nvPr>
+            <p:ph type="title"/>
+          </p:nvPr>
+        </p:nvSpPr>
+        <p:spPr/>
+        <p:txBody>
+          <a:bodyPr/>
+          <a:lstStyle/>
+          <a:p>
+            <a:r>
+              <a:rPr lang="fr-FR" dirty="0" smtClean="0">
+                <a:solidFill>
+                  <a:schemeClr val="bg1"/>
+                </a:solidFill>
+              </a:rPr>
+              <a:t>L’utilité</a:t>
+            </a:r>
+            <a:endParaRPr lang="fr-FR" dirty="0">
+              <a:solidFill>
+                <a:schemeClr val="bg1"/>
+              </a:solidFill>
+            </a:endParaRPr>
+          </a:p>
+        </p:txBody>
+      </p:sp>
+      <p:sp>
+        <p:nvSpPr>
+          <p:cNvPr id="6" name="Espace réservé du contenu 5"/>
+          <p:cNvSpPr>
+            <a:spLocks noGrp="1"/>
+          </p:cNvSpPr>
+          <p:nvPr>
+            <p:ph idx="1"/>
+          </p:nvPr>
+        </p:nvSpPr>
+        <p:spPr/>
+        <p:txBody>
+          <a:bodyPr/>
+          <a:lstStyle/>
+          <a:p>
+            <a:r>
+              <a:rPr lang="fr-FR" dirty="0" smtClean="0"/>
+              <a:t>Valide la robustesse des tests</a:t>
+            </a:r>
+          </a:p>
+          <a:p>
+            <a:r>
+              <a:rPr lang="fr-FR" dirty="0" smtClean="0"/>
+              <a:t>Génère peu de mutants avec le TDD</a:t>
+            </a:r>
+          </a:p>
+          <a:p>
+            <a:r>
+              <a:rPr lang="fr-FR" dirty="0" smtClean="0"/>
+              <a:t>Identifier les cas non gérés lors de l’ajout de tests sur du </a:t>
+            </a:r>
+            <a:r>
+              <a:rPr lang="fr-FR" dirty="0" err="1" smtClean="0"/>
+              <a:t>legacy</a:t>
+            </a:r>
+            <a:endParaRPr lang="fr-FR" dirty="0" smtClean="0"/>
+          </a:p>
+          <a:p>
+            <a:endParaRPr lang="fr-FR" dirty="0"/>
+          </a:p>
+          <a:p>
+            <a:pPr marL="0" indent="0" algn="ctr">
+              <a:buNone/>
+            </a:pPr>
+            <a:r>
+              <a:rPr lang="fr-FR" u="sng" dirty="0" smtClean="0"/>
+              <a:t>Confiance</a:t>
+            </a:r>
+            <a:endParaRPr lang="fr-FR" u="sng" dirty="0"/>
+          </a:p>
+        </p:txBody>
+      </p:sp>
+    </p:spTree>
+    <p:extLst>
+      <p:ext uri="{BB962C8B-B14F-4D97-AF65-F5344CB8AC3E}">
+        <p14:creationId xmlns:p14="http://schemas.microsoft.com/office/powerpoint/2010/main" val="1168475052"/>
+      </p:ext>
+    </p:extLst>
+  </p:cSld>
+  <p:clrMapOvr>
+    <a:masterClrMapping/>
+  </p:clrMapOvr>
+  <mc:AlternateContent xmlns:mc="http://schemas.openxmlformats.org/markup-compatibility/2006" xmlns:p14="http://schemas.microsoft.com/office/powerpoint/2010/main">
+    <mc:Choice Requires="p14">
+      <p:transition spd="med" p14:dur="700">
+        <p:fade/>
+      </p:transition>
+    </mc:Choice>
+    <mc:Fallback xmlns="">
       <p:transition spd="med">
         <p:fade/>
       </p:transition>
@@ -4948,7 +4899,7 @@
                   <a:schemeClr val="bg1"/>
                 </a:solidFill>
               </a:rPr>
-              <a:t>L’utilité</a:t>
+              <a:t>Un inconvénient : le coût</a:t>
             </a:r>
             <a:endParaRPr lang="fr-FR" dirty="0">
               <a:solidFill>
@@ -4973,62 +4924,83 @@
           <a:bodyPr/>
           <a:lstStyle/>
           <a:p>
+            <a:pPr marL="0" indent="0">
+              <a:buNone/>
+            </a:pPr>
             <a:r>
               <a:rPr lang="fr-FR" dirty="0" smtClean="0"/>
-              <a:t>Valide la robustesse des tests</a:t>
-            </a:r>
+              <a:t>Imaginons un projet : </a:t>
+            </a:r>
+          </a:p>
+          <a:p>
+            <a:pPr lvl="1"/>
+            <a:r>
+              <a:rPr lang="fr-FR" dirty="0" smtClean="0"/>
+              <a:t>200 classes testées</a:t>
+            </a:r>
+          </a:p>
+          <a:p>
+            <a:pPr lvl="1"/>
+            <a:r>
+              <a:rPr lang="fr-FR" dirty="0" smtClean="0"/>
+              <a:t>Moyenne de 5 mutants / classe</a:t>
+            </a:r>
+          </a:p>
+          <a:p>
+            <a:pPr lvl="1"/>
+            <a:r>
+              <a:rPr lang="fr-FR" dirty="0" smtClean="0"/>
+              <a:t>Jeu de tests complet exécuté en 30 secondes</a:t>
+            </a:r>
+          </a:p>
+          <a:p>
+            <a:pPr lvl="1"/>
             <a:endParaRPr lang="fr-FR" dirty="0" smtClean="0"/>
           </a:p>
           <a:p>
+            <a:pPr marL="457200" lvl="1" indent="0" algn="ctr">
+              <a:buNone/>
+            </a:pPr>
+            <a:r>
+              <a:rPr lang="fr-FR" u="sng" dirty="0" smtClean="0"/>
+              <a:t>Temps d’exécution des tests (sans l’analyse et la génération des mutants) :</a:t>
+            </a:r>
+          </a:p>
+          <a:p>
+            <a:pPr marL="457200" lvl="1" indent="0" algn="ctr">
+              <a:buNone/>
+            </a:pPr>
+            <a:endParaRPr lang="fr-FR" u="sng" dirty="0" smtClean="0"/>
+          </a:p>
+          <a:p>
+            <a:pPr marL="457200" lvl="1" indent="0" algn="ctr">
+              <a:buNone/>
+            </a:pPr>
             <a:r>
               <a:rPr lang="fr-FR" dirty="0" smtClean="0"/>
-              <a:t>Génère peu de mutants avec le TDD</a:t>
-            </a:r>
-            <a:endParaRPr lang="fr-FR" dirty="0" smtClean="0"/>
-          </a:p>
-          <a:p>
-            <a:r>
-              <a:rPr lang="fr-FR" dirty="0" smtClean="0"/>
-              <a:t>Identifier les cas non gérés lors de l’ajout de tests sur du </a:t>
-            </a:r>
-            <a:r>
-              <a:rPr lang="fr-FR" dirty="0" err="1" smtClean="0"/>
-              <a:t>legacy</a:t>
-            </a:r>
-            <a:endParaRPr lang="fr-FR" dirty="0" smtClean="0"/>
-          </a:p>
-          <a:p>
+              <a:t>200 * 5 * 0,5 = 500 minutes (8h20)</a:t>
+            </a:r>
             <a:endParaRPr lang="fr-FR" dirty="0"/>
-          </a:p>
-          <a:p>
-            <a:pPr marL="0" indent="0" algn="ctr">
-              <a:buNone/>
-            </a:pPr>
-            <a:r>
-              <a:rPr lang="fr-FR" u="sng" dirty="0" smtClean="0"/>
-              <a:t>Confiance</a:t>
-            </a:r>
-            <a:endParaRPr lang="fr-FR" u="sng" dirty="0"/>
           </a:p>
         </p:txBody>
       </p:sp>
     </p:spTree>
     <p:extLst>
       <p:ext uri="{BB962C8B-B14F-4D97-AF65-F5344CB8AC3E}">
-        <p14:creationId xmlns:p14="http://schemas.microsoft.com/office/powerpoint/2010/main" val="1168475052"/>
+        <p14:creationId xmlns:p14="http://schemas.microsoft.com/office/powerpoint/2010/main" val="3252526193"/>
       </p:ext>
     </p:extLst>
   </p:cSld>
   <p:clrMapOvr>
     <a:masterClrMapping/>
   </p:clrMapOvr>
-  <mc:AlternateContent xmlns:mc="http://schemas.openxmlformats.org/markup-compatibility/2006">
-    <mc:Choice xmlns:p14="http://schemas.microsoft.com/office/powerpoint/2010/main" Requires="p14">
+  <mc:AlternateContent xmlns:mc="http://schemas.openxmlformats.org/markup-compatibility/2006" xmlns:p14="http://schemas.microsoft.com/office/powerpoint/2010/main">
+    <mc:Choice Requires="p14">
       <p:transition spd="med" p14:dur="700">
         <p:fade/>
       </p:transition>
     </mc:Choice>
-    <mc:Fallback>
+    <mc:Fallback xmlns="">
       <p:transition spd="med">
         <p:fade/>
       </p:transition>
@@ -5045,161 +5017,6 @@
 </file>
 
 <file path=ppt/slides/slide8.xml><?xml version="1.0" encoding="utf-8"?>
-<p:sld xmlns:a="http://schemas.openxmlformats.org/drawingml/2006/main" xmlns:r="http://schemas.openxmlformats.org/officeDocument/2006/relationships" xmlns:p="http://schemas.openxmlformats.org/presentationml/2006/main">
-  <p:cSld>
-    <p:spTree>
-      <p:nvGrpSpPr>
-        <p:cNvPr id="1" name=""/>
-        <p:cNvGrpSpPr/>
-        <p:nvPr/>
-      </p:nvGrpSpPr>
-      <p:grpSpPr>
-        <a:xfrm>
-          <a:off x="0" y="0"/>
-          <a:ext cx="0" cy="0"/>
-          <a:chOff x="0" y="0"/>
-          <a:chExt cx="0" cy="0"/>
-        </a:xfrm>
-      </p:grpSpPr>
-      <p:sp>
-        <p:nvSpPr>
-          <p:cNvPr id="2" name="Titre 1"/>
-          <p:cNvSpPr>
-            <a:spLocks noGrp="1"/>
-          </p:cNvSpPr>
-          <p:nvPr>
-            <p:ph type="title"/>
-          </p:nvPr>
-        </p:nvSpPr>
-        <p:spPr/>
-        <p:txBody>
-          <a:bodyPr/>
-          <a:lstStyle/>
-          <a:p>
-            <a:r>
-              <a:rPr lang="fr-FR" dirty="0" smtClean="0">
-                <a:solidFill>
-                  <a:schemeClr val="bg1"/>
-                </a:solidFill>
-              </a:rPr>
-              <a:t>Un inconvénient : le coût</a:t>
-            </a:r>
-            <a:endParaRPr lang="fr-FR" dirty="0">
-              <a:solidFill>
-                <a:schemeClr val="bg1"/>
-              </a:solidFill>
-            </a:endParaRPr>
-          </a:p>
-        </p:txBody>
-      </p:sp>
-      <p:sp>
-        <p:nvSpPr>
-          <p:cNvPr id="6" name="Espace réservé du contenu 5"/>
-          <p:cNvSpPr>
-            <a:spLocks noGrp="1"/>
-          </p:cNvSpPr>
-          <p:nvPr>
-            <p:ph idx="1"/>
-          </p:nvPr>
-        </p:nvSpPr>
-        <p:spPr/>
-        <p:txBody>
-          <a:bodyPr/>
-          <a:lstStyle/>
-          <a:p>
-            <a:pPr marL="0" indent="0">
-              <a:buNone/>
-            </a:pPr>
-            <a:r>
-              <a:rPr lang="fr-FR" dirty="0" smtClean="0"/>
-              <a:t>Imaginons un projet : </a:t>
-            </a:r>
-          </a:p>
-          <a:p>
-            <a:pPr lvl="1"/>
-            <a:r>
-              <a:rPr lang="fr-FR" dirty="0" smtClean="0"/>
-              <a:t>200 classes testées</a:t>
-            </a:r>
-          </a:p>
-          <a:p>
-            <a:pPr lvl="1"/>
-            <a:r>
-              <a:rPr lang="fr-FR" dirty="0" smtClean="0"/>
-              <a:t>Moyenne de 5 mutants / classe</a:t>
-            </a:r>
-          </a:p>
-          <a:p>
-            <a:pPr lvl="1"/>
-            <a:r>
-              <a:rPr lang="fr-FR" dirty="0" smtClean="0"/>
-              <a:t>Jeu de tests complet exécuté en 30 secondes</a:t>
-            </a:r>
-          </a:p>
-          <a:p>
-            <a:pPr lvl="1"/>
-            <a:endParaRPr lang="fr-FR" dirty="0" smtClean="0"/>
-          </a:p>
-          <a:p>
-            <a:pPr marL="457200" lvl="1" indent="0" algn="ctr">
-              <a:buNone/>
-            </a:pPr>
-            <a:r>
-              <a:rPr lang="fr-FR" u="sng" dirty="0" smtClean="0"/>
-              <a:t>Temps d’exécution des tests (sans l’analyse et la génération des mutants) :</a:t>
-            </a:r>
-          </a:p>
-          <a:p>
-            <a:pPr marL="457200" lvl="1" indent="0" algn="ctr">
-              <a:buNone/>
-            </a:pPr>
-            <a:endParaRPr lang="fr-FR" u="sng" dirty="0" smtClean="0"/>
-          </a:p>
-          <a:p>
-            <a:pPr marL="457200" lvl="1" indent="0" algn="ctr">
-              <a:buNone/>
-            </a:pPr>
-            <a:r>
-              <a:rPr lang="fr-FR" dirty="0" smtClean="0"/>
-              <a:t>200 * 5 * 0,5 = 500 minutes (8h20)</a:t>
-            </a:r>
-            <a:endParaRPr lang="fr-FR" dirty="0"/>
-          </a:p>
-        </p:txBody>
-      </p:sp>
-    </p:spTree>
-    <p:extLst>
-      <p:ext uri="{BB962C8B-B14F-4D97-AF65-F5344CB8AC3E}">
-        <p14:creationId xmlns:p14="http://schemas.microsoft.com/office/powerpoint/2010/main" val="3252526193"/>
-      </p:ext>
-    </p:extLst>
-  </p:cSld>
-  <p:clrMapOvr>
-    <a:masterClrMapping/>
-  </p:clrMapOvr>
-  <mc:AlternateContent xmlns:mc="http://schemas.openxmlformats.org/markup-compatibility/2006">
-    <mc:Choice xmlns:p14="http://schemas.microsoft.com/office/powerpoint/2010/main" Requires="p14">
-      <p:transition spd="med" p14:dur="700">
-        <p:fade/>
-      </p:transition>
-    </mc:Choice>
-    <mc:Fallback>
-      <p:transition spd="med">
-        <p:fade/>
-      </p:transition>
-    </mc:Fallback>
-  </mc:AlternateContent>
-  <p:timing>
-    <p:tnLst>
-      <p:par>
-        <p:cTn id="1" dur="indefinite" restart="never" nodeType="tmRoot"/>
-      </p:par>
-    </p:tnLst>
-  </p:timing>
-</p:sld>
-</file>
-
-<file path=ppt/slides/slide9.xml><?xml version="1.0" encoding="utf-8"?>
 <p:sld xmlns:a="http://schemas.openxmlformats.org/drawingml/2006/main" xmlns:r="http://schemas.openxmlformats.org/officeDocument/2006/relationships" xmlns:p="http://schemas.openxmlformats.org/presentationml/2006/main">
   <p:cSld>
     <p:bg>

</xml_diff>